<commit_message>
Tweaked g1, started adding g2
</commit_message>
<xml_diff>
--- a/git_group1.pptx
+++ b/git_group1.pptx
@@ -3134,8 +3134,16 @@
           <a:lstStyle/>
           <a:p>
             <a:r>
-              <a:rPr lang="en-US" dirty="0" smtClean="0"/>
-              <a:t>Version control and </a:t>
+              <a:rPr lang="en-US" dirty="0"/>
+              <a:t>v</a:t>
+            </a:r>
+            <a:r>
+              <a:rPr lang="en-US" dirty="0" smtClean="0"/>
+              <a:t>ersion </a:t>
+            </a:r>
+            <a:r>
+              <a:rPr lang="en-US" dirty="0" smtClean="0"/>
+              <a:t>control and </a:t>
             </a:r>
             <a:r>
               <a:rPr lang="en-US" b="1" dirty="0" err="1" smtClean="0"/>

</xml_diff>